<commit_message>
added more building block files on air flow network
</commit_message>
<xml_diff>
--- a/Toolkit/Airloop and AFN Diagrams.pptx
+++ b/Toolkit/Airloop and AFN Diagrams.pptx
@@ -105,6 +105,11 @@
       </a:defRPr>
     </a:lvl9pPr>
   </p:defaultTextStyle>
+  <p:extLst>
+    <p:ext uri="{EFAFB233-063F-42B5-8137-9DF3F51BA10A}">
+      <p15:sldGuideLst xmlns:p15="http://schemas.microsoft.com/office/powerpoint/2012/main"/>
+    </p:ext>
+  </p:extLst>
 </p:presentation>
 </file>
 
@@ -421,6 +426,90 @@
       </a:p>
     </p188:txBody>
   </p188:cm>
+  <p188:cm id="{9DDFCBB1-0563-4CA9-9E67-89ACEAF17451}" authorId="{A68544D2-BBE0-C5D1-1056-56D84119E05C}" created="2022-08-14T01:25:29.562">
+    <pc:sldMkLst xmlns:pc="http://schemas.microsoft.com/office/powerpoint/2013/main/command">
+      <pc:docMk/>
+      <pc:sldMk cId="1716325451" sldId="258"/>
+    </pc:sldMkLst>
+    <p188:pos x="7756525" y="2085975"/>
+    <p188:txBody>
+      <a:bodyPr/>
+      <a:lstStyle/>
+      <a:p>
+        <a:r>
+          <a:rPr lang="en-US"/>
+          <a:t>AirflowNetwork:Distribution:Linkage,
+    CoolingCoilLink,   !- Name
+    FanOutletNode,     !- Node 1 Name
+    HeatingInletNode,  !- Node 2 Name
+    Main Cooling Coil;   !- Component Name</a:t>
+        </a:r>
+      </a:p>
+    </p188:txBody>
+  </p188:cm>
+  <p188:cm id="{3DAED34D-7D06-48D2-A4DC-5F8C997B94CB}" authorId="{A68544D2-BBE0-C5D1-1056-56D84119E05C}" created="2022-08-14T01:26:18.456">
+    <pc:sldMkLst xmlns:pc="http://schemas.microsoft.com/office/powerpoint/2013/main/command">
+      <pc:docMk/>
+      <pc:sldMk cId="1716325451" sldId="258"/>
+    </pc:sldMkLst>
+    <p188:pos x="11998325" y="955675"/>
+    <p188:txBody>
+      <a:bodyPr/>
+      <a:lstStyle/>
+      <a:p>
+        <a:r>
+          <a:rPr lang="en-US"/>
+          <a:t>AirflowNetwork:Distribution:Linkage,
+    HeatingCoilLink,
+    HeatingInletNode,
+    SuppHeatingInletNode,
+    Main Heating Coil;</a:t>
+        </a:r>
+      </a:p>
+    </p188:txBody>
+  </p188:cm>
+  <p188:cm id="{513E25C6-E623-4E9A-9D49-F2C9EF4F3BD9}" authorId="{A68544D2-BBE0-C5D1-1056-56D84119E05C}" created="2022-08-14T01:28:43.313">
+    <pc:sldMkLst xmlns:pc="http://schemas.microsoft.com/office/powerpoint/2013/main/command">
+      <pc:docMk/>
+      <pc:sldMk cId="1716325451" sldId="258"/>
+    </pc:sldMkLst>
+    <p188:pos x="11242675" y="168275"/>
+    <p188:txBody>
+      <a:bodyPr/>
+      <a:lstStyle/>
+      <a:p>
+        <a:r>
+          <a:rPr lang="en-US"/>
+          <a:t>AirflowNetwork:Distribution:Linkage,
+    SuppHeatingCoilLink,    !- Name
+    SuppHeatingInletNode,  !- Node 1 Name
+    HeatingOutletNode,  !- Node 2 Name
+    Supp Heating Coil;        !- Component Name</a:t>
+        </a:r>
+      </a:p>
+    </p188:txBody>
+  </p188:cm>
+  <p188:cm id="{61162AB6-41A1-41DC-B349-87CE17AB2322}" authorId="{A68544D2-BBE0-C5D1-1056-56D84119E05C}" created="2022-08-14T01:29:44.534">
+    <pc:sldMkLst xmlns:pc="http://schemas.microsoft.com/office/powerpoint/2013/main/command">
+      <pc:docMk/>
+      <pc:sldMk cId="1716325451" sldId="258"/>
+    </pc:sldMkLst>
+    <p188:pos x="6321425" y="631825"/>
+    <p188:txBody>
+      <a:bodyPr/>
+      <a:lstStyle/>
+      <a:p>
+        <a:r>
+          <a:rPr lang="en-US"/>
+          <a:t>AirflowNetwork:Distribution:Linkage,
+    EquipmentAirLoopLink,  !- Name
+    HeatingOutletNode, !- Node 1 Name
+    EquipmentInletNode,!- Node 2 Name
+    AirLoopSupply;     !- Component Name</a:t>
+        </a:r>
+      </a:p>
+    </p188:txBody>
+  </p188:cm>
 </p188:cmLst>
 </file>
 
@@ -571,7 +660,7 @@
           <a:p>
             <a:fld id="{0AFC0508-2E4F-42D2-999D-469524DE2342}" type="datetimeFigureOut">
               <a:rPr lang="en-US" smtClean="0"/>
-              <a:t>8/12/2022</a:t>
+              <a:t>8/13/2022</a:t>
             </a:fld>
             <a:endParaRPr lang="en-US"/>
           </a:p>
@@ -769,7 +858,7 @@
           <a:p>
             <a:fld id="{0AFC0508-2E4F-42D2-999D-469524DE2342}" type="datetimeFigureOut">
               <a:rPr lang="en-US" smtClean="0"/>
-              <a:t>8/12/2022</a:t>
+              <a:t>8/13/2022</a:t>
             </a:fld>
             <a:endParaRPr lang="en-US"/>
           </a:p>
@@ -977,7 +1066,7 @@
           <a:p>
             <a:fld id="{0AFC0508-2E4F-42D2-999D-469524DE2342}" type="datetimeFigureOut">
               <a:rPr lang="en-US" smtClean="0"/>
-              <a:t>8/12/2022</a:t>
+              <a:t>8/13/2022</a:t>
             </a:fld>
             <a:endParaRPr lang="en-US"/>
           </a:p>
@@ -1175,7 +1264,7 @@
           <a:p>
             <a:fld id="{0AFC0508-2E4F-42D2-999D-469524DE2342}" type="datetimeFigureOut">
               <a:rPr lang="en-US" smtClean="0"/>
-              <a:t>8/12/2022</a:t>
+              <a:t>8/13/2022</a:t>
             </a:fld>
             <a:endParaRPr lang="en-US"/>
           </a:p>
@@ -1450,7 +1539,7 @@
           <a:p>
             <a:fld id="{0AFC0508-2E4F-42D2-999D-469524DE2342}" type="datetimeFigureOut">
               <a:rPr lang="en-US" smtClean="0"/>
-              <a:t>8/12/2022</a:t>
+              <a:t>8/13/2022</a:t>
             </a:fld>
             <a:endParaRPr lang="en-US"/>
           </a:p>
@@ -1715,7 +1804,7 @@
           <a:p>
             <a:fld id="{0AFC0508-2E4F-42D2-999D-469524DE2342}" type="datetimeFigureOut">
               <a:rPr lang="en-US" smtClean="0"/>
-              <a:t>8/12/2022</a:t>
+              <a:t>8/13/2022</a:t>
             </a:fld>
             <a:endParaRPr lang="en-US"/>
           </a:p>
@@ -2127,7 +2216,7 @@
           <a:p>
             <a:fld id="{0AFC0508-2E4F-42D2-999D-469524DE2342}" type="datetimeFigureOut">
               <a:rPr lang="en-US" smtClean="0"/>
-              <a:t>8/12/2022</a:t>
+              <a:t>8/13/2022</a:t>
             </a:fld>
             <a:endParaRPr lang="en-US"/>
           </a:p>
@@ -2268,7 +2357,7 @@
           <a:p>
             <a:fld id="{0AFC0508-2E4F-42D2-999D-469524DE2342}" type="datetimeFigureOut">
               <a:rPr lang="en-US" smtClean="0"/>
-              <a:t>8/12/2022</a:t>
+              <a:t>8/13/2022</a:t>
             </a:fld>
             <a:endParaRPr lang="en-US"/>
           </a:p>
@@ -2381,7 +2470,7 @@
           <a:p>
             <a:fld id="{0AFC0508-2E4F-42D2-999D-469524DE2342}" type="datetimeFigureOut">
               <a:rPr lang="en-US" smtClean="0"/>
-              <a:t>8/12/2022</a:t>
+              <a:t>8/13/2022</a:t>
             </a:fld>
             <a:endParaRPr lang="en-US"/>
           </a:p>
@@ -2692,7 +2781,7 @@
           <a:p>
             <a:fld id="{0AFC0508-2E4F-42D2-999D-469524DE2342}" type="datetimeFigureOut">
               <a:rPr lang="en-US" smtClean="0"/>
-              <a:t>8/12/2022</a:t>
+              <a:t>8/13/2022</a:t>
             </a:fld>
             <a:endParaRPr lang="en-US"/>
           </a:p>
@@ -2980,7 +3069,7 @@
           <a:p>
             <a:fld id="{0AFC0508-2E4F-42D2-999D-469524DE2342}" type="datetimeFigureOut">
               <a:rPr lang="en-US" smtClean="0"/>
-              <a:t>8/12/2022</a:t>
+              <a:t>8/13/2022</a:t>
             </a:fld>
             <a:endParaRPr lang="en-US"/>
           </a:p>
@@ -3221,7 +3310,7 @@
           <a:p>
             <a:fld id="{0AFC0508-2E4F-42D2-999D-469524DE2342}" type="datetimeFigureOut">
               <a:rPr lang="en-US" smtClean="0"/>
-              <a:t>8/12/2022</a:t>
+              <a:t>8/13/2022</a:t>
             </a:fld>
             <a:endParaRPr lang="en-US"/>
           </a:p>
@@ -5772,6 +5861,160 @@
           </a:p>
         </p:txBody>
       </p:sp>
+      <p:sp>
+        <p:nvSpPr>
+          <p:cNvPr id="2" name="Rectangle 1">
+            <a:extLst>
+              <a:ext uri="{FF2B5EF4-FFF2-40B4-BE49-F238E27FC236}">
+                <a16:creationId xmlns:a16="http://schemas.microsoft.com/office/drawing/2014/main" id="{413C5D66-9559-9B66-6249-31637B48E243}"/>
+              </a:ext>
+            </a:extLst>
+          </p:cNvPr>
+          <p:cNvSpPr/>
+          <p:nvPr/>
+        </p:nvSpPr>
+        <p:spPr>
+          <a:xfrm>
+            <a:off x="10302476" y="2112881"/>
+            <a:ext cx="1495077" cy="304813"/>
+          </a:xfrm>
+          <a:prstGeom prst="rect">
+            <a:avLst/>
+          </a:prstGeom>
+          <a:solidFill>
+            <a:schemeClr val="bg1"/>
+          </a:solidFill>
+          <a:ln w="19050">
+            <a:solidFill>
+              <a:schemeClr val="bg1"/>
+            </a:solidFill>
+          </a:ln>
+        </p:spPr>
+        <p:style>
+          <a:lnRef idx="2">
+            <a:schemeClr val="accent1">
+              <a:shade val="50000"/>
+            </a:schemeClr>
+          </a:lnRef>
+          <a:fillRef idx="1">
+            <a:schemeClr val="accent1"/>
+          </a:fillRef>
+          <a:effectRef idx="0">
+            <a:schemeClr val="accent1"/>
+          </a:effectRef>
+          <a:fontRef idx="minor">
+            <a:schemeClr val="lt1"/>
+          </a:fontRef>
+        </p:style>
+        <p:txBody>
+          <a:bodyPr rtlCol="0" anchor="ctr"/>
+          <a:lstStyle/>
+          <a:p>
+            <a:pPr algn="ctr"/>
+            <a:r>
+              <a:rPr lang="en-US" sz="1300" dirty="0">
+                <a:solidFill>
+                  <a:srgbClr val="FF0000"/>
+                </a:solidFill>
+              </a:rPr>
+              <a:t>(</a:t>
+            </a:r>
+            <a:r>
+              <a:rPr lang="en-US" sz="1300" dirty="0" err="1">
+                <a:solidFill>
+                  <a:srgbClr val="FF0000"/>
+                </a:solidFill>
+              </a:rPr>
+              <a:t>HeatingInletNode</a:t>
+            </a:r>
+            <a:r>
+              <a:rPr lang="en-US" sz="1300" dirty="0">
+                <a:solidFill>
+                  <a:srgbClr val="FF0000"/>
+                </a:solidFill>
+              </a:rPr>
+              <a:t>)</a:t>
+            </a:r>
+          </a:p>
+        </p:txBody>
+      </p:sp>
+      <p:sp>
+        <p:nvSpPr>
+          <p:cNvPr id="3" name="Rectangle 2">
+            <a:extLst>
+              <a:ext uri="{FF2B5EF4-FFF2-40B4-BE49-F238E27FC236}">
+                <a16:creationId xmlns:a16="http://schemas.microsoft.com/office/drawing/2014/main" id="{BF355323-4DB8-A6A7-DC06-A086B7E84AB5}"/>
+              </a:ext>
+            </a:extLst>
+          </p:cNvPr>
+          <p:cNvSpPr/>
+          <p:nvPr/>
+        </p:nvSpPr>
+        <p:spPr>
+          <a:xfrm>
+            <a:off x="8658225" y="346467"/>
+            <a:ext cx="1793035" cy="259120"/>
+          </a:xfrm>
+          <a:prstGeom prst="rect">
+            <a:avLst/>
+          </a:prstGeom>
+          <a:solidFill>
+            <a:schemeClr val="bg1"/>
+          </a:solidFill>
+          <a:ln w="19050">
+            <a:solidFill>
+              <a:schemeClr val="bg1"/>
+            </a:solidFill>
+          </a:ln>
+        </p:spPr>
+        <p:style>
+          <a:lnRef idx="2">
+            <a:schemeClr val="accent1">
+              <a:shade val="50000"/>
+            </a:schemeClr>
+          </a:lnRef>
+          <a:fillRef idx="1">
+            <a:schemeClr val="accent1"/>
+          </a:fillRef>
+          <a:effectRef idx="0">
+            <a:schemeClr val="accent1"/>
+          </a:effectRef>
+          <a:fontRef idx="minor">
+            <a:schemeClr val="lt1"/>
+          </a:fontRef>
+        </p:style>
+        <p:txBody>
+          <a:bodyPr rtlCol="0" anchor="ctr"/>
+          <a:lstStyle/>
+          <a:p>
+            <a:pPr algn="ctr"/>
+            <a:r>
+              <a:rPr lang="en-US" sz="1400" dirty="0">
+                <a:solidFill>
+                  <a:srgbClr val="FF0000"/>
+                </a:solidFill>
+              </a:rPr>
+              <a:t>(</a:t>
+            </a:r>
+            <a:r>
+              <a:rPr lang="en-US" sz="1400" dirty="0" err="1">
+                <a:solidFill>
+                  <a:srgbClr val="FF0000"/>
+                </a:solidFill>
+              </a:rPr>
+              <a:t>HeatingOutletNode</a:t>
+            </a:r>
+            <a:r>
+              <a:rPr lang="en-US" sz="1400" dirty="0">
+                <a:solidFill>
+                  <a:srgbClr val="FF0000"/>
+                </a:solidFill>
+              </a:rPr>
+              <a:t>)</a:t>
+            </a:r>
+          </a:p>
+        </p:txBody>
+      </p:sp>
     </p:spTree>
     <p:extLst>
       <p:ext uri="{BB962C8B-B14F-4D97-AF65-F5344CB8AC3E}">

</xml_diff>

<commit_message>
refactoring of HVAC equipment building blocks
</commit_message>
<xml_diff>
--- a/Toolkit/Airloop and AFN Diagrams.pptx
+++ b/Toolkit/Airloop and AFN Diagrams.pptx
@@ -426,27 +426,6 @@
       </a:p>
     </p188:txBody>
   </p188:cm>
-  <p188:cm id="{9DDFCBB1-0563-4CA9-9E67-89ACEAF17451}" authorId="{A68544D2-BBE0-C5D1-1056-56D84119E05C}" created="2022-08-14T01:25:29.562">
-    <pc:sldMkLst xmlns:pc="http://schemas.microsoft.com/office/powerpoint/2013/main/command">
-      <pc:docMk/>
-      <pc:sldMk cId="1716325451" sldId="258"/>
-    </pc:sldMkLst>
-    <p188:pos x="7756525" y="2085975"/>
-    <p188:txBody>
-      <a:bodyPr/>
-      <a:lstStyle/>
-      <a:p>
-        <a:r>
-          <a:rPr lang="en-US"/>
-          <a:t>AirflowNetwork:Distribution:Linkage,
-    CoolingCoilLink,   !- Name
-    FanOutletNode,     !- Node 1 Name
-    HeatingInletNode,  !- Node 2 Name
-    Main Cooling Coil;   !- Component Name</a:t>
-        </a:r>
-      </a:p>
-    </p188:txBody>
-  </p188:cm>
   <p188:cm id="{3DAED34D-7D06-48D2-A4DC-5F8C997B94CB}" authorId="{A68544D2-BBE0-C5D1-1056-56D84119E05C}" created="2022-08-14T01:26:18.456">
     <pc:sldMkLst xmlns:pc="http://schemas.microsoft.com/office/powerpoint/2013/main/command">
       <pc:docMk/>
@@ -513,6 +492,125 @@
 </p188:cmLst>
 </file>
 
+<file path=ppt/comments/modernComment_103_5040A340.xml><?xml version="1.0" encoding="utf-8"?>
+<p188:cmLst xmlns:a="http://schemas.openxmlformats.org/drawingml/2006/main" xmlns:r="http://schemas.openxmlformats.org/officeDocument/2006/relationships" xmlns:p188="http://schemas.microsoft.com/office/powerpoint/2018/8/main">
+  <p188:cm id="{42411642-4DD6-4839-9BA8-8B2BA7052D89}" authorId="{A68544D2-BBE0-C5D1-1056-56D84119E05C}" created="2022-08-15T18:49:56.188">
+    <pc:sldMkLst xmlns:pc="http://schemas.microsoft.com/office/powerpoint/2013/main/command">
+      <pc:docMk/>
+      <pc:sldMk cId="1346413376" sldId="259"/>
+    </pc:sldMkLst>
+    <p188:pos x="6334125" y="219075"/>
+    <p188:txBody>
+      <a:bodyPr/>
+      <a:lstStyle/>
+      <a:p>
+        <a:r>
+          <a:rPr lang="en-US"/>
+          <a:t>!-   ===========  ALL OBJECTS IN CLASS: AIRLOOPHVAC ===========
+AirLoopHVAC,
+    Central System, !- Name
+    ,                           !- Controller List Name
+    availability list,      	!- Availability Manager List Name
+    autosize,                   !- Design Supply Air Flow Rate {m3/s}
+    Air Loop Branches,          !- Branch List Name
+    ,                           !- Connector List Name
+    Air Loop Inlet Node,        !- Supply Side Inlet Node Name
+    Return Air Mixer Outlet,    !- Demand Side Outlet Node Name
+    Zone Equipment Inlet Node,  !- Demand Side Inlet Node Names
+    Air Loop Outlet Node;       !- Supply Side Outlet Node Names</a:t>
+        </a:r>
+      </a:p>
+    </p188:txBody>
+  </p188:cm>
+  <p188:cm id="{2FC353B0-1CE8-4A39-923A-63F8269912CB}" authorId="{A68544D2-BBE0-C5D1-1056-56D84119E05C}" created="2022-08-15T18:50:09.103">
+    <pc:sldMkLst xmlns:pc="http://schemas.microsoft.com/office/powerpoint/2013/main/command">
+      <pc:docMk/>
+      <pc:sldMk cId="1346413376" sldId="259"/>
+    </pc:sldMkLst>
+    <p188:pos x="3041650" y="2952750"/>
+    <p188:txBody>
+      <a:bodyPr/>
+      <a:lstStyle/>
+      <a:p>
+        <a:r>
+          <a:rPr lang="en-US"/>
+          <a:t>!-   ===========  ALL OBJECTS IN CLASS: AirLoopHVAC:ZoneSplitter ===========
+AirLoopHVAC:ZoneSplitter,
+    Zone Supply Air Splitter,	!- Name
+    Zone Equipment Inlet Node,  	!- Inlet Node Name
+    Zone Inlet Node ATInlet;         	!- Outlet 1 Node Name</a:t>
+        </a:r>
+      </a:p>
+    </p188:txBody>
+  </p188:cm>
+  <p188:cm id="{6CF98735-9090-497A-9F0A-B77F5ADE898C}" authorId="{A68544D2-BBE0-C5D1-1056-56D84119E05C}" created="2022-08-15T18:54:14.787">
+    <pc:sldMkLst xmlns:pc="http://schemas.microsoft.com/office/powerpoint/2013/main/command">
+      <pc:docMk/>
+      <pc:sldMk cId="1346413376" sldId="259"/>
+    </pc:sldMkLst>
+    <p188:pos x="3521075" y="3406775"/>
+    <p188:txBody>
+      <a:bodyPr/>
+      <a:lstStyle/>
+      <a:p>
+        <a:r>
+          <a:rPr lang="en-US"/>
+          <a:t>!-   ===========  ALL OBJECTS IN CLASS: AIRLOOPHVAC:SUPPLYPATH ===========
+AirLoopHVAC:SupplyPath,
+    SupplyPath,    !- Name
+    Zone Equipment Inlet Node,   !- Supply Air Path Inlet Node Name
+    AirLoopHVAC:ZoneSplitter,   	!- Component 1 Object Type
+    Zone Supply Air Splitter;   	!- Component 1 Name</a:t>
+        </a:r>
+      </a:p>
+    </p188:txBody>
+  </p188:cm>
+  <p188:cm id="{6F4E1A24-F253-4A45-896C-39920A291E56}" authorId="{A68544D2-BBE0-C5D1-1056-56D84119E05C}" created="2022-08-15T18:56:26.775">
+    <pc:sldMkLst xmlns:pc="http://schemas.microsoft.com/office/powerpoint/2013/main/command">
+      <pc:docMk/>
+      <pc:sldMk cId="1346413376" sldId="259"/>
+    </pc:sldMkLst>
+    <p188:pos x="2854325" y="5965825"/>
+    <p188:txBody>
+      <a:bodyPr/>
+      <a:lstStyle/>
+      <a:p>
+        <a:r>
+          <a:rPr lang="en-US"/>
+          <a:t>!-   ===========  ALL OBJECTS IN CLASS: AIRLOOPHVAC:ZONEMIXER ===========
+AirLoopHVAC:ZoneMixer,
+    Zone Return Air Mixer,      	!- Name
+    Return Air Mixer Outlet,    	!- Outlet Node Name
+    Zone Outlet Node;           	!- Inlet 1 Node Name</a:t>
+        </a:r>
+      </a:p>
+    </p188:txBody>
+  </p188:cm>
+  <p188:cm id="{E0FF9510-7420-48FD-8D0D-B9925B126466}" authorId="{A68544D2-BBE0-C5D1-1056-56D84119E05C}" created="2022-08-15T18:57:48.979">
+    <pc:sldMkLst xmlns:pc="http://schemas.microsoft.com/office/powerpoint/2013/main/command">
+      <pc:docMk/>
+      <pc:sldMk cId="1346413376" sldId="259"/>
+    </pc:sldMkLst>
+    <p188:pos x="1263650" y="5832475"/>
+    <p188:txBody>
+      <a:bodyPr/>
+      <a:lstStyle/>
+      <a:p>
+        <a:r>
+          <a:rPr lang="en-US"/>
+          <a:t>!-   ===========  ALL OBJECTS IN CLASS: AIRLOOPHVAC:RETURNPATH ===========
+AirLoopHVAC:ReturnPath,
+    ReturnPath,         !- Name
+    Return Air Mixer Outlet,    	!- Return Air Path Outlet Node Name
+    AirLoopHVAC:ZoneMixer,      	!- Component 1 Object Type
+    Zone Return Air Mixer;      	!- Component 1 Name</a:t>
+        </a:r>
+      </a:p>
+    </p188:txBody>
+  </p188:cm>
+</p188:cmLst>
+</file>
+
 <file path=ppt/slideLayouts/slideLayout1.xml><?xml version="1.0" encoding="utf-8"?>
 <p:sldLayout xmlns:a="http://schemas.openxmlformats.org/drawingml/2006/main" xmlns:r="http://schemas.openxmlformats.org/officeDocument/2006/relationships" xmlns:p="http://schemas.openxmlformats.org/presentationml/2006/main" type="title" preserve="1">
   <p:cSld name="Title Slide">
@@ -660,7 +758,7 @@
           <a:p>
             <a:fld id="{0AFC0508-2E4F-42D2-999D-469524DE2342}" type="datetimeFigureOut">
               <a:rPr lang="en-US" smtClean="0"/>
-              <a:t>8/13/2022</a:t>
+              <a:t>8/15/2022</a:t>
             </a:fld>
             <a:endParaRPr lang="en-US"/>
           </a:p>
@@ -858,7 +956,7 @@
           <a:p>
             <a:fld id="{0AFC0508-2E4F-42D2-999D-469524DE2342}" type="datetimeFigureOut">
               <a:rPr lang="en-US" smtClean="0"/>
-              <a:t>8/13/2022</a:t>
+              <a:t>8/15/2022</a:t>
             </a:fld>
             <a:endParaRPr lang="en-US"/>
           </a:p>
@@ -1066,7 +1164,7 @@
           <a:p>
             <a:fld id="{0AFC0508-2E4F-42D2-999D-469524DE2342}" type="datetimeFigureOut">
               <a:rPr lang="en-US" smtClean="0"/>
-              <a:t>8/13/2022</a:t>
+              <a:t>8/15/2022</a:t>
             </a:fld>
             <a:endParaRPr lang="en-US"/>
           </a:p>
@@ -1264,7 +1362,7 @@
           <a:p>
             <a:fld id="{0AFC0508-2E4F-42D2-999D-469524DE2342}" type="datetimeFigureOut">
               <a:rPr lang="en-US" smtClean="0"/>
-              <a:t>8/13/2022</a:t>
+              <a:t>8/15/2022</a:t>
             </a:fld>
             <a:endParaRPr lang="en-US"/>
           </a:p>
@@ -1539,7 +1637,7 @@
           <a:p>
             <a:fld id="{0AFC0508-2E4F-42D2-999D-469524DE2342}" type="datetimeFigureOut">
               <a:rPr lang="en-US" smtClean="0"/>
-              <a:t>8/13/2022</a:t>
+              <a:t>8/15/2022</a:t>
             </a:fld>
             <a:endParaRPr lang="en-US"/>
           </a:p>
@@ -1804,7 +1902,7 @@
           <a:p>
             <a:fld id="{0AFC0508-2E4F-42D2-999D-469524DE2342}" type="datetimeFigureOut">
               <a:rPr lang="en-US" smtClean="0"/>
-              <a:t>8/13/2022</a:t>
+              <a:t>8/15/2022</a:t>
             </a:fld>
             <a:endParaRPr lang="en-US"/>
           </a:p>
@@ -2216,7 +2314,7 @@
           <a:p>
             <a:fld id="{0AFC0508-2E4F-42D2-999D-469524DE2342}" type="datetimeFigureOut">
               <a:rPr lang="en-US" smtClean="0"/>
-              <a:t>8/13/2022</a:t>
+              <a:t>8/15/2022</a:t>
             </a:fld>
             <a:endParaRPr lang="en-US"/>
           </a:p>
@@ -2357,7 +2455,7 @@
           <a:p>
             <a:fld id="{0AFC0508-2E4F-42D2-999D-469524DE2342}" type="datetimeFigureOut">
               <a:rPr lang="en-US" smtClean="0"/>
-              <a:t>8/13/2022</a:t>
+              <a:t>8/15/2022</a:t>
             </a:fld>
             <a:endParaRPr lang="en-US"/>
           </a:p>
@@ -2470,7 +2568,7 @@
           <a:p>
             <a:fld id="{0AFC0508-2E4F-42D2-999D-469524DE2342}" type="datetimeFigureOut">
               <a:rPr lang="en-US" smtClean="0"/>
-              <a:t>8/13/2022</a:t>
+              <a:t>8/15/2022</a:t>
             </a:fld>
             <a:endParaRPr lang="en-US"/>
           </a:p>
@@ -2781,7 +2879,7 @@
           <a:p>
             <a:fld id="{0AFC0508-2E4F-42D2-999D-469524DE2342}" type="datetimeFigureOut">
               <a:rPr lang="en-US" smtClean="0"/>
-              <a:t>8/13/2022</a:t>
+              <a:t>8/15/2022</a:t>
             </a:fld>
             <a:endParaRPr lang="en-US"/>
           </a:p>
@@ -3069,7 +3167,7 @@
           <a:p>
             <a:fld id="{0AFC0508-2E4F-42D2-999D-469524DE2342}" type="datetimeFigureOut">
               <a:rPr lang="en-US" smtClean="0"/>
-              <a:t>8/13/2022</a:t>
+              <a:t>8/15/2022</a:t>
             </a:fld>
             <a:endParaRPr lang="en-US"/>
           </a:p>
@@ -3310,7 +3408,7 @@
           <a:p>
             <a:fld id="{0AFC0508-2E4F-42D2-999D-469524DE2342}" type="datetimeFigureOut">
               <a:rPr lang="en-US" smtClean="0"/>
-              <a:t>8/13/2022</a:t>
+              <a:t>8/15/2022</a:t>
             </a:fld>
             <a:endParaRPr lang="en-US"/>
           </a:p>
@@ -3742,7 +3840,7 @@
           <p:nvPr/>
         </p:nvPicPr>
         <p:blipFill>
-          <a:blip r:embed="rId2">
+          <a:blip r:embed="rId3">
             <a:extLst>
               <a:ext uri="{28A0092B-C50C-407E-A947-70E740481C1C}">
                 <a14:useLocalDpi xmlns:a14="http://schemas.microsoft.com/office/drawing/2010/main" val="0"/>
@@ -3845,6 +3943,11 @@
   <p:clrMapOvr>
     <a:masterClrMapping/>
   </p:clrMapOvr>
+  <p:extLst>
+    <p:ext uri="{6950BFC3-D8DA-4A85-94F7-54DA5524770B}">
+      <p188:commentRel xmlns:p188="http://schemas.microsoft.com/office/powerpoint/2018/8/main" r:id="rId2"/>
+    </p:ext>
+  </p:extLst>
 </p:sld>
 </file>
 
@@ -5831,8 +5934,8 @@
         </p:nvSpPr>
         <p:spPr>
           <a:xfrm>
-            <a:off x="10451260" y="678174"/>
-            <a:ext cx="897763" cy="415498"/>
+            <a:off x="10385968" y="605587"/>
+            <a:ext cx="927369" cy="900246"/>
           </a:xfrm>
           <a:prstGeom prst="rect">
             <a:avLst/>
@@ -5845,6 +5948,20 @@
           </a:bodyPr>
           <a:lstStyle/>
           <a:p>
+            <a:r>
+              <a:rPr lang="en-US" sz="1050" dirty="0"/>
+              <a:t>Supp Heating Coil Air Inlet Node</a:t>
+            </a:r>
+          </a:p>
+          <a:p>
+            <a:r>
+              <a:rPr lang="en-US" sz="1050" dirty="0">
+                <a:solidFill>
+                  <a:srgbClr val="FF0000"/>
+                </a:solidFill>
+              </a:rPr>
+              <a:t>(</a:t>
+            </a:r>
             <a:r>
               <a:rPr lang="en-US" sz="1050" dirty="0" err="1">
                 <a:solidFill>
@@ -5853,11 +5970,14 @@
               </a:rPr>
               <a:t>SuppHeatingInletNode</a:t>
             </a:r>
-            <a:endParaRPr lang="en-US" sz="1050" dirty="0">
-              <a:solidFill>
-                <a:srgbClr val="FF0000"/>
-              </a:solidFill>
-            </a:endParaRPr>
+            <a:r>
+              <a:rPr lang="en-US" sz="1050" dirty="0">
+                <a:solidFill>
+                  <a:srgbClr val="FF0000"/>
+                </a:solidFill>
+              </a:rPr>
+              <a:t>)</a:t>
+            </a:r>
           </a:p>
         </p:txBody>
       </p:sp>

</xml_diff>

<commit_message>
zonal HVAC working. adding in code for central HVAC, airloop, etc.
</commit_message>
<xml_diff>
--- a/Toolkit/Airloop and AFN Diagrams.pptx
+++ b/Toolkit/Airloop and AFN Diagrams.pptx
@@ -758,7 +758,7 @@
           <a:p>
             <a:fld id="{0AFC0508-2E4F-42D2-999D-469524DE2342}" type="datetimeFigureOut">
               <a:rPr lang="en-US" smtClean="0"/>
-              <a:t>8/15/2022</a:t>
+              <a:t>8/25/2022</a:t>
             </a:fld>
             <a:endParaRPr lang="en-US"/>
           </a:p>
@@ -956,7 +956,7 @@
           <a:p>
             <a:fld id="{0AFC0508-2E4F-42D2-999D-469524DE2342}" type="datetimeFigureOut">
               <a:rPr lang="en-US" smtClean="0"/>
-              <a:t>8/15/2022</a:t>
+              <a:t>8/25/2022</a:t>
             </a:fld>
             <a:endParaRPr lang="en-US"/>
           </a:p>
@@ -1164,7 +1164,7 @@
           <a:p>
             <a:fld id="{0AFC0508-2E4F-42D2-999D-469524DE2342}" type="datetimeFigureOut">
               <a:rPr lang="en-US" smtClean="0"/>
-              <a:t>8/15/2022</a:t>
+              <a:t>8/25/2022</a:t>
             </a:fld>
             <a:endParaRPr lang="en-US"/>
           </a:p>
@@ -1362,7 +1362,7 @@
           <a:p>
             <a:fld id="{0AFC0508-2E4F-42D2-999D-469524DE2342}" type="datetimeFigureOut">
               <a:rPr lang="en-US" smtClean="0"/>
-              <a:t>8/15/2022</a:t>
+              <a:t>8/25/2022</a:t>
             </a:fld>
             <a:endParaRPr lang="en-US"/>
           </a:p>
@@ -1637,7 +1637,7 @@
           <a:p>
             <a:fld id="{0AFC0508-2E4F-42D2-999D-469524DE2342}" type="datetimeFigureOut">
               <a:rPr lang="en-US" smtClean="0"/>
-              <a:t>8/15/2022</a:t>
+              <a:t>8/25/2022</a:t>
             </a:fld>
             <a:endParaRPr lang="en-US"/>
           </a:p>
@@ -1902,7 +1902,7 @@
           <a:p>
             <a:fld id="{0AFC0508-2E4F-42D2-999D-469524DE2342}" type="datetimeFigureOut">
               <a:rPr lang="en-US" smtClean="0"/>
-              <a:t>8/15/2022</a:t>
+              <a:t>8/25/2022</a:t>
             </a:fld>
             <a:endParaRPr lang="en-US"/>
           </a:p>
@@ -2314,7 +2314,7 @@
           <a:p>
             <a:fld id="{0AFC0508-2E4F-42D2-999D-469524DE2342}" type="datetimeFigureOut">
               <a:rPr lang="en-US" smtClean="0"/>
-              <a:t>8/15/2022</a:t>
+              <a:t>8/25/2022</a:t>
             </a:fld>
             <a:endParaRPr lang="en-US"/>
           </a:p>
@@ -2455,7 +2455,7 @@
           <a:p>
             <a:fld id="{0AFC0508-2E4F-42D2-999D-469524DE2342}" type="datetimeFigureOut">
               <a:rPr lang="en-US" smtClean="0"/>
-              <a:t>8/15/2022</a:t>
+              <a:t>8/25/2022</a:t>
             </a:fld>
             <a:endParaRPr lang="en-US"/>
           </a:p>
@@ -2568,7 +2568,7 @@
           <a:p>
             <a:fld id="{0AFC0508-2E4F-42D2-999D-469524DE2342}" type="datetimeFigureOut">
               <a:rPr lang="en-US" smtClean="0"/>
-              <a:t>8/15/2022</a:t>
+              <a:t>8/25/2022</a:t>
             </a:fld>
             <a:endParaRPr lang="en-US"/>
           </a:p>
@@ -2879,7 +2879,7 @@
           <a:p>
             <a:fld id="{0AFC0508-2E4F-42D2-999D-469524DE2342}" type="datetimeFigureOut">
               <a:rPr lang="en-US" smtClean="0"/>
-              <a:t>8/15/2022</a:t>
+              <a:t>8/25/2022</a:t>
             </a:fld>
             <a:endParaRPr lang="en-US"/>
           </a:p>
@@ -3167,7 +3167,7 @@
           <a:p>
             <a:fld id="{0AFC0508-2E4F-42D2-999D-469524DE2342}" type="datetimeFigureOut">
               <a:rPr lang="en-US" smtClean="0"/>
-              <a:t>8/15/2022</a:t>
+              <a:t>8/25/2022</a:t>
             </a:fld>
             <a:endParaRPr lang="en-US"/>
           </a:p>
@@ -3408,7 +3408,7 @@
           <a:p>
             <a:fld id="{0AFC0508-2E4F-42D2-999D-469524DE2342}" type="datetimeFigureOut">
               <a:rPr lang="en-US" smtClean="0"/>
-              <a:t>8/15/2022</a:t>
+              <a:t>8/25/2022</a:t>
             </a:fld>
             <a:endParaRPr lang="en-US"/>
           </a:p>

</xml_diff>